<commit_message>
updates and refactor code specific to news
</commit_message>
<xml_diff>
--- a/Progetto-Finale-Front-End-Markiyan-Kmit.pptx
+++ b/Progetto-Finale-Front-End-Markiyan-Kmit.pptx
@@ -307,7 +307,7 @@
           <a:p>
             <a:fld id="{7F4CB77C-A607-45D8-9436-29FAAC1061A6}" type="datetimeFigureOut">
               <a:rPr lang="it-IT" smtClean="0"/>
-              <a:t>31/03/2022</a:t>
+              <a:t>01/04/2022</a:t>
             </a:fld>
             <a:endParaRPr lang="it-IT" dirty="0"/>
           </a:p>
@@ -605,7 +605,7 @@
           <a:p>
             <a:fld id="{7F4CB77C-A607-45D8-9436-29FAAC1061A6}" type="datetimeFigureOut">
               <a:rPr lang="it-IT" smtClean="0"/>
-              <a:t>31/03/2022</a:t>
+              <a:t>01/04/2022</a:t>
             </a:fld>
             <a:endParaRPr lang="it-IT" dirty="0"/>
           </a:p>
@@ -797,7 +797,7 @@
           <a:p>
             <a:fld id="{7F4CB77C-A607-45D8-9436-29FAAC1061A6}" type="datetimeFigureOut">
               <a:rPr lang="it-IT" smtClean="0"/>
-              <a:t>31/03/2022</a:t>
+              <a:t>01/04/2022</a:t>
             </a:fld>
             <a:endParaRPr lang="it-IT" dirty="0"/>
           </a:p>
@@ -1058,7 +1058,7 @@
           <a:p>
             <a:fld id="{7F4CB77C-A607-45D8-9436-29FAAC1061A6}" type="datetimeFigureOut">
               <a:rPr lang="it-IT" smtClean="0"/>
-              <a:t>31/03/2022</a:t>
+              <a:t>01/04/2022</a:t>
             </a:fld>
             <a:endParaRPr lang="it-IT" dirty="0"/>
           </a:p>
@@ -1482,7 +1482,7 @@
           <a:p>
             <a:fld id="{7F4CB77C-A607-45D8-9436-29FAAC1061A6}" type="datetimeFigureOut">
               <a:rPr lang="it-IT" smtClean="0"/>
-              <a:t>31/03/2022</a:t>
+              <a:t>01/04/2022</a:t>
             </a:fld>
             <a:endParaRPr lang="it-IT" dirty="0"/>
           </a:p>
@@ -2019,7 +2019,7 @@
           <a:p>
             <a:fld id="{7F4CB77C-A607-45D8-9436-29FAAC1061A6}" type="datetimeFigureOut">
               <a:rPr lang="it-IT" smtClean="0"/>
-              <a:t>31/03/2022</a:t>
+              <a:t>01/04/2022</a:t>
             </a:fld>
             <a:endParaRPr lang="it-IT" dirty="0"/>
           </a:p>
@@ -2883,7 +2883,7 @@
           <a:p>
             <a:fld id="{7F4CB77C-A607-45D8-9436-29FAAC1061A6}" type="datetimeFigureOut">
               <a:rPr lang="it-IT" smtClean="0"/>
-              <a:t>31/03/2022</a:t>
+              <a:t>01/04/2022</a:t>
             </a:fld>
             <a:endParaRPr lang="it-IT" dirty="0"/>
           </a:p>
@@ -3053,7 +3053,7 @@
           <a:p>
             <a:fld id="{7F4CB77C-A607-45D8-9436-29FAAC1061A6}" type="datetimeFigureOut">
               <a:rPr lang="it-IT" smtClean="0"/>
-              <a:t>31/03/2022</a:t>
+              <a:t>01/04/2022</a:t>
             </a:fld>
             <a:endParaRPr lang="it-IT" dirty="0"/>
           </a:p>
@@ -3237,7 +3237,7 @@
           <a:p>
             <a:fld id="{7F4CB77C-A607-45D8-9436-29FAAC1061A6}" type="datetimeFigureOut">
               <a:rPr lang="it-IT" smtClean="0"/>
-              <a:t>31/03/2022</a:t>
+              <a:t>01/04/2022</a:t>
             </a:fld>
             <a:endParaRPr lang="it-IT" dirty="0"/>
           </a:p>
@@ -3407,7 +3407,7 @@
           <a:p>
             <a:fld id="{7F4CB77C-A607-45D8-9436-29FAAC1061A6}" type="datetimeFigureOut">
               <a:rPr lang="it-IT" smtClean="0"/>
-              <a:t>31/03/2022</a:t>
+              <a:t>01/04/2022</a:t>
             </a:fld>
             <a:endParaRPr lang="it-IT" dirty="0"/>
           </a:p>
@@ -3651,7 +3651,7 @@
           <a:p>
             <a:fld id="{7F4CB77C-A607-45D8-9436-29FAAC1061A6}" type="datetimeFigureOut">
               <a:rPr lang="it-IT" smtClean="0"/>
-              <a:t>31/03/2022</a:t>
+              <a:t>01/04/2022</a:t>
             </a:fld>
             <a:endParaRPr lang="it-IT" dirty="0"/>
           </a:p>
@@ -3887,7 +3887,7 @@
           <a:p>
             <a:fld id="{7F4CB77C-A607-45D8-9436-29FAAC1061A6}" type="datetimeFigureOut">
               <a:rPr lang="it-IT" smtClean="0"/>
-              <a:t>31/03/2022</a:t>
+              <a:t>01/04/2022</a:t>
             </a:fld>
             <a:endParaRPr lang="it-IT" dirty="0"/>
           </a:p>
@@ -4353,7 +4353,7 @@
           <a:p>
             <a:fld id="{7F4CB77C-A607-45D8-9436-29FAAC1061A6}" type="datetimeFigureOut">
               <a:rPr lang="it-IT" smtClean="0"/>
-              <a:t>31/03/2022</a:t>
+              <a:t>01/04/2022</a:t>
             </a:fld>
             <a:endParaRPr lang="it-IT" dirty="0"/>
           </a:p>
@@ -4471,7 +4471,7 @@
           <a:p>
             <a:fld id="{7F4CB77C-A607-45D8-9436-29FAAC1061A6}" type="datetimeFigureOut">
               <a:rPr lang="it-IT" smtClean="0"/>
-              <a:t>31/03/2022</a:t>
+              <a:t>01/04/2022</a:t>
             </a:fld>
             <a:endParaRPr lang="it-IT" dirty="0"/>
           </a:p>
@@ -4566,7 +4566,7 @@
           <a:p>
             <a:fld id="{7F4CB77C-A607-45D8-9436-29FAAC1061A6}" type="datetimeFigureOut">
               <a:rPr lang="it-IT" smtClean="0"/>
-              <a:t>31/03/2022</a:t>
+              <a:t>01/04/2022</a:t>
             </a:fld>
             <a:endParaRPr lang="it-IT" dirty="0"/>
           </a:p>
@@ -4821,7 +4821,7 @@
           <a:p>
             <a:fld id="{7F4CB77C-A607-45D8-9436-29FAAC1061A6}" type="datetimeFigureOut">
               <a:rPr lang="it-IT" smtClean="0"/>
-              <a:t>31/03/2022</a:t>
+              <a:t>01/04/2022</a:t>
             </a:fld>
             <a:endParaRPr lang="it-IT" dirty="0"/>
           </a:p>
@@ -5121,7 +5121,7 @@
           <a:p>
             <a:fld id="{7F4CB77C-A607-45D8-9436-29FAAC1061A6}" type="datetimeFigureOut">
               <a:rPr lang="it-IT" smtClean="0"/>
-              <a:t>31/03/2022</a:t>
+              <a:t>01/04/2022</a:t>
             </a:fld>
             <a:endParaRPr lang="it-IT" dirty="0"/>
           </a:p>
@@ -5355,7 +5355,7 @@
           <a:p>
             <a:fld id="{7F4CB77C-A607-45D8-9436-29FAAC1061A6}" type="datetimeFigureOut">
               <a:rPr lang="it-IT" smtClean="0"/>
-              <a:t>31/03/2022</a:t>
+              <a:t>01/04/2022</a:t>
             </a:fld>
             <a:endParaRPr lang="it-IT" dirty="0"/>
           </a:p>
@@ -6612,14 +6612,24 @@
               <a:buNone/>
             </a:pPr>
             <a:r>
-              <a:rPr lang="it-IT" b="0" dirty="0">
+              <a:rPr lang="it-IT" dirty="0">
                 <a:solidFill>
                   <a:srgbClr val="F8F8F2"/>
                 </a:solidFill>
                 <a:effectLst/>
                 <a:latin typeface="Consolas" panose="020B0609020204030204" pitchFamily="49" charset="0"/>
               </a:rPr>
-              <a:t>Come da richiesta ho infatti utilizzato tre API diverse:</a:t>
+              <a:t>Ho </a:t>
+            </a:r>
+            <a:r>
+              <a:rPr lang="it-IT" b="0" dirty="0">
+                <a:solidFill>
+                  <a:srgbClr val="F8F8F2"/>
+                </a:solidFill>
+                <a:effectLst/>
+                <a:latin typeface="Consolas" panose="020B0609020204030204" pitchFamily="49" charset="0"/>
+              </a:rPr>
+              <a:t>utilizzato tre API diverse:</a:t>
             </a:r>
           </a:p>
           <a:p>
@@ -6804,6 +6814,30 @@
             <a:pPr marL="36900" indent="0">
               <a:buNone/>
             </a:pPr>
+            <a:endParaRPr lang="it-IT" dirty="0">
+              <a:solidFill>
+                <a:srgbClr val="F8F8F2"/>
+              </a:solidFill>
+              <a:effectLst/>
+              <a:latin typeface="Consolas" panose="020B0609020204030204" pitchFamily="49" charset="0"/>
+            </a:endParaRPr>
+          </a:p>
+          <a:p>
+            <a:pPr marL="36900" indent="0">
+              <a:buNone/>
+            </a:pPr>
+            <a:endParaRPr lang="it-IT" dirty="0">
+              <a:solidFill>
+                <a:srgbClr val="F8F8F2"/>
+              </a:solidFill>
+              <a:effectLst/>
+              <a:latin typeface="Consolas" panose="020B0609020204030204" pitchFamily="49" charset="0"/>
+            </a:endParaRPr>
+          </a:p>
+          <a:p>
+            <a:pPr marL="36900" indent="0">
+              <a:buNone/>
+            </a:pPr>
             <a:r>
               <a:rPr lang="it-IT" dirty="0">
                 <a:solidFill>
@@ -6971,6 +7005,58 @@
                 <a:latin typeface="Consolas" panose="020B0609020204030204" pitchFamily="49" charset="0"/>
               </a:rPr>
               <a:t>La posizione dell’utente, se data, viene salvata in localStorage per visualizzare il meteo. È inoltre possibile impostare una località di default che sovrascrive quella della posizione corrente.</a:t>
+            </a:r>
+          </a:p>
+          <a:p>
+            <a:r>
+              <a:rPr lang="it-IT" dirty="0">
+                <a:solidFill>
+                  <a:srgbClr val="F8F8F2"/>
+                </a:solidFill>
+                <a:effectLst/>
+                <a:latin typeface="Consolas" panose="020B0609020204030204" pitchFamily="49" charset="0"/>
+              </a:rPr>
+              <a:t>Inoltre utilizzando </a:t>
+            </a:r>
+            <a:r>
+              <a:rPr lang="it-IT" dirty="0" err="1">
+                <a:solidFill>
+                  <a:srgbClr val="F8F8F2"/>
+                </a:solidFill>
+                <a:effectLst/>
+                <a:latin typeface="Consolas" panose="020B0609020204030204" pitchFamily="49" charset="0"/>
+              </a:rPr>
+              <a:t>redux-persist</a:t>
+            </a:r>
+            <a:r>
+              <a:rPr lang="it-IT" dirty="0">
+                <a:solidFill>
+                  <a:srgbClr val="F8F8F2"/>
+                </a:solidFill>
+                <a:effectLst/>
+                <a:latin typeface="Consolas" panose="020B0609020204030204" pitchFamily="49" charset="0"/>
+              </a:rPr>
+              <a:t> lo state dell’utente viene salvato su </a:t>
+            </a:r>
+            <a:r>
+              <a:rPr lang="it-IT" dirty="0" err="1">
+                <a:solidFill>
+                  <a:srgbClr val="F8F8F2"/>
+                </a:solidFill>
+                <a:effectLst/>
+                <a:latin typeface="Consolas" panose="020B0609020204030204" pitchFamily="49" charset="0"/>
+              </a:rPr>
+              <a:t>localStorage</a:t>
+            </a:r>
+            <a:r>
+              <a:rPr lang="it-IT" dirty="0">
+                <a:solidFill>
+                  <a:srgbClr val="F8F8F2"/>
+                </a:solidFill>
+                <a:effectLst/>
+                <a:latin typeface="Consolas" panose="020B0609020204030204" pitchFamily="49" charset="0"/>
+              </a:rPr>
+              <a:t>, in modo che ricaricando la pagina da loggati non si atterra su login (comportamento che aveva prima di questa modifica)</a:t>
             </a:r>
           </a:p>
         </p:txBody>

</xml_diff>